<commit_message>
I hate writing documentation sigh..
</commit_message>
<xml_diff>
--- a/documents/deployment_schema.pptx
+++ b/documents/deployment_schema.pptx
@@ -6,7 +6,6 @@
   </p:sldMasterIdLst>
   <p:sldIdLst>
     <p:sldId id="256" r:id="rId2"/>
-    <p:sldId id="257" r:id="rId3"/>
   </p:sldIdLst>
   <p:sldSz cx="9144000" cy="6858000" type="screen4x3"/>
   <p:notesSz cx="6858000" cy="9144000"/>
@@ -289,7 +288,7 @@
           <a:p>
             <a:fld id="{6C4E7E50-CEDA-46B5-94FB-9633F7E7D07F}" type="datetimeFigureOut">
               <a:rPr lang="fr-FR" smtClean="0"/>
-              <a:t>08/08/2016</a:t>
+              <a:t>09/08/2016</a:t>
             </a:fld>
             <a:endParaRPr lang="fr-FR"/>
           </a:p>
@@ -459,7 +458,7 @@
           <a:p>
             <a:fld id="{6C4E7E50-CEDA-46B5-94FB-9633F7E7D07F}" type="datetimeFigureOut">
               <a:rPr lang="fr-FR" smtClean="0"/>
-              <a:t>08/08/2016</a:t>
+              <a:t>09/08/2016</a:t>
             </a:fld>
             <a:endParaRPr lang="fr-FR"/>
           </a:p>
@@ -639,7 +638,7 @@
           <a:p>
             <a:fld id="{6C4E7E50-CEDA-46B5-94FB-9633F7E7D07F}" type="datetimeFigureOut">
               <a:rPr lang="fr-FR" smtClean="0"/>
-              <a:t>08/08/2016</a:t>
+              <a:t>09/08/2016</a:t>
             </a:fld>
             <a:endParaRPr lang="fr-FR"/>
           </a:p>
@@ -809,7 +808,7 @@
           <a:p>
             <a:fld id="{6C4E7E50-CEDA-46B5-94FB-9633F7E7D07F}" type="datetimeFigureOut">
               <a:rPr lang="fr-FR" smtClean="0"/>
-              <a:t>08/08/2016</a:t>
+              <a:t>09/08/2016</a:t>
             </a:fld>
             <a:endParaRPr lang="fr-FR"/>
           </a:p>
@@ -1055,7 +1054,7 @@
           <a:p>
             <a:fld id="{6C4E7E50-CEDA-46B5-94FB-9633F7E7D07F}" type="datetimeFigureOut">
               <a:rPr lang="fr-FR" smtClean="0"/>
-              <a:t>08/08/2016</a:t>
+              <a:t>09/08/2016</a:t>
             </a:fld>
             <a:endParaRPr lang="fr-FR"/>
           </a:p>
@@ -1343,7 +1342,7 @@
           <a:p>
             <a:fld id="{6C4E7E50-CEDA-46B5-94FB-9633F7E7D07F}" type="datetimeFigureOut">
               <a:rPr lang="fr-FR" smtClean="0"/>
-              <a:t>08/08/2016</a:t>
+              <a:t>09/08/2016</a:t>
             </a:fld>
             <a:endParaRPr lang="fr-FR"/>
           </a:p>
@@ -1765,7 +1764,7 @@
           <a:p>
             <a:fld id="{6C4E7E50-CEDA-46B5-94FB-9633F7E7D07F}" type="datetimeFigureOut">
               <a:rPr lang="fr-FR" smtClean="0"/>
-              <a:t>08/08/2016</a:t>
+              <a:t>09/08/2016</a:t>
             </a:fld>
             <a:endParaRPr lang="fr-FR"/>
           </a:p>
@@ -1883,7 +1882,7 @@
           <a:p>
             <a:fld id="{6C4E7E50-CEDA-46B5-94FB-9633F7E7D07F}" type="datetimeFigureOut">
               <a:rPr lang="fr-FR" smtClean="0"/>
-              <a:t>08/08/2016</a:t>
+              <a:t>09/08/2016</a:t>
             </a:fld>
             <a:endParaRPr lang="fr-FR"/>
           </a:p>
@@ -1978,7 +1977,7 @@
           <a:p>
             <a:fld id="{6C4E7E50-CEDA-46B5-94FB-9633F7E7D07F}" type="datetimeFigureOut">
               <a:rPr lang="fr-FR" smtClean="0"/>
-              <a:t>08/08/2016</a:t>
+              <a:t>09/08/2016</a:t>
             </a:fld>
             <a:endParaRPr lang="fr-FR"/>
           </a:p>
@@ -2255,7 +2254,7 @@
           <a:p>
             <a:fld id="{6C4E7E50-CEDA-46B5-94FB-9633F7E7D07F}" type="datetimeFigureOut">
               <a:rPr lang="fr-FR" smtClean="0"/>
-              <a:t>08/08/2016</a:t>
+              <a:t>09/08/2016</a:t>
             </a:fld>
             <a:endParaRPr lang="fr-FR"/>
           </a:p>
@@ -2508,7 +2507,7 @@
           <a:p>
             <a:fld id="{6C4E7E50-CEDA-46B5-94FB-9633F7E7D07F}" type="datetimeFigureOut">
               <a:rPr lang="fr-FR" smtClean="0"/>
-              <a:t>08/08/2016</a:t>
+              <a:t>09/08/2016</a:t>
             </a:fld>
             <a:endParaRPr lang="fr-FR"/>
           </a:p>
@@ -2721,7 +2720,7 @@
           <a:p>
             <a:fld id="{6C4E7E50-CEDA-46B5-94FB-9633F7E7D07F}" type="datetimeFigureOut">
               <a:rPr lang="fr-FR" smtClean="0"/>
-              <a:t>08/08/2016</a:t>
+              <a:t>09/08/2016</a:t>
             </a:fld>
             <a:endParaRPr lang="fr-FR"/>
           </a:p>
@@ -3296,12 +3295,14 @@
         <p:spPr>
           <a:xfrm>
             <a:off x="0" y="619240"/>
-            <a:ext cx="3724399" cy="276999"/>
+            <a:ext cx="2790979" cy="276999"/>
           </a:xfrm>
           <a:prstGeom prst="rect">
             <a:avLst/>
           </a:prstGeom>
-          <a:noFill/>
+          <a:solidFill>
+            <a:srgbClr val="FFFF00"/>
+          </a:solidFill>
         </p:spPr>
         <p:txBody>
           <a:bodyPr wrap="square" rtlCol="0">
@@ -3447,9 +3448,21 @@
               </a:r>
               <a:r>
                 <a:rPr lang="fr-FR" sz="1100" b="1" dirty="0" smtClean="0"/>
-                <a:t> Source directory</a:t>
+                <a:t> </a:t>
               </a:r>
-              <a:endParaRPr lang="fr-FR" sz="1100" b="1" dirty="0"/>
+              <a:r>
+                <a:rPr lang="fr-FR" sz="1100" b="1" dirty="0" smtClean="0">
+                  <a:solidFill>
+                    <a:srgbClr val="006600"/>
+                  </a:solidFill>
+                </a:rPr>
+                <a:t>Source directory</a:t>
+              </a:r>
+              <a:endParaRPr lang="fr-FR" sz="1100" b="1" dirty="0">
+                <a:solidFill>
+                  <a:srgbClr val="006600"/>
+                </a:solidFill>
+              </a:endParaRPr>
             </a:p>
           </p:txBody>
         </p:sp>
@@ -4171,7 +4184,7 @@
         <p:spPr>
           <a:xfrm>
             <a:off x="924689" y="2010207"/>
-            <a:ext cx="2211614" cy="215444"/>
+            <a:ext cx="1877545" cy="215444"/>
           </a:xfrm>
           <a:prstGeom prst="rect">
             <a:avLst/>
@@ -4210,20 +4223,6 @@
                 <a:cs typeface="Consolas" panose="020B0609020204030204" pitchFamily="49" charset="0"/>
               </a:rPr>
               <a:t>class\</a:t>
-            </a:r>
-            <a:r>
-              <a:rPr lang="fr-FR" sz="800" dirty="0" err="1" smtClean="0">
-                <a:latin typeface="Consolas" panose="020B0609020204030204" pitchFamily="49" charset="0"/>
-                <a:cs typeface="Consolas" panose="020B0609020204030204" pitchFamily="49" charset="0"/>
-              </a:rPr>
-              <a:t>vendor</a:t>
-            </a:r>
-            <a:r>
-              <a:rPr lang="fr-FR" sz="800" dirty="0" smtClean="0">
-                <a:latin typeface="Consolas" panose="020B0609020204030204" pitchFamily="49" charset="0"/>
-                <a:cs typeface="Consolas" panose="020B0609020204030204" pitchFamily="49" charset="0"/>
-              </a:rPr>
-              <a:t>\</a:t>
             </a:r>
             <a:r>
               <a:rPr lang="fr-FR" sz="800" dirty="0" err="1" smtClean="0">
@@ -4313,7 +4312,7 @@
               <a:t>$source</a:t>
             </a:r>
             <a:r>
-              <a:rPr lang="fr-FR" sz="800" dirty="0">
+              <a:rPr lang="fr-FR" sz="800" dirty="0" smtClean="0">
                 <a:solidFill>
                   <a:schemeClr val="tx2">
                     <a:lumMod val="75000"/>
@@ -4322,17 +4321,39 @@
                 <a:latin typeface="Consolas" panose="020B0609020204030204" pitchFamily="49" charset="0"/>
                 <a:cs typeface="Consolas" panose="020B0609020204030204" pitchFamily="49" charset="0"/>
               </a:rPr>
-              <a:t>\client</a:t>
-            </a:r>
-            <a:r>
-              <a:rPr lang="fr-FR" sz="800" dirty="0" smtClean="0">
-                <a:solidFill>
-                  <a:srgbClr val="00B050"/>
+              <a:t>\</a:t>
+            </a:r>
+            <a:r>
+              <a:rPr lang="fr-FR" sz="800" dirty="0" err="1" smtClean="0">
+                <a:solidFill>
+                  <a:schemeClr val="tx2">
+                    <a:lumMod val="75000"/>
+                  </a:schemeClr>
                 </a:solidFill>
                 <a:latin typeface="Consolas" panose="020B0609020204030204" pitchFamily="49" charset="0"/>
                 <a:cs typeface="Consolas" panose="020B0609020204030204" pitchFamily="49" charset="0"/>
               </a:rPr>
-              <a:t>-serveur\</a:t>
+              <a:t>client</a:t>
+            </a:r>
+            <a:r>
+              <a:rPr lang="fr-FR" sz="800" dirty="0" err="1" smtClean="0">
+                <a:solidFill>
+                  <a:srgbClr val="00B050"/>
+                </a:solidFill>
+                <a:latin typeface="Consolas" panose="020B0609020204030204" pitchFamily="49" charset="0"/>
+                <a:cs typeface="Consolas" panose="020B0609020204030204" pitchFamily="49" charset="0"/>
+              </a:rPr>
+              <a:t>-server</a:t>
+            </a:r>
+            <a:r>
+              <a:rPr lang="fr-FR" sz="800" dirty="0" smtClean="0">
+                <a:solidFill>
+                  <a:srgbClr val="00B050"/>
+                </a:solidFill>
+                <a:latin typeface="Consolas" panose="020B0609020204030204" pitchFamily="49" charset="0"/>
+                <a:cs typeface="Consolas" panose="020B0609020204030204" pitchFamily="49" charset="0"/>
+              </a:rPr>
+              <a:t>\</a:t>
             </a:r>
             <a:r>
               <a:rPr lang="fr-FR" sz="800" dirty="0" err="1" smtClean="0">
@@ -4591,26 +4612,6 @@
                 <a:cs typeface="Consolas" panose="020B0609020204030204" pitchFamily="49" charset="0"/>
               </a:rPr>
               <a:t>class\</a:t>
-            </a:r>
-            <a:r>
-              <a:rPr lang="fr-FR" sz="800" dirty="0" err="1" smtClean="0">
-                <a:solidFill>
-                  <a:srgbClr val="0070C0"/>
-                </a:solidFill>
-                <a:latin typeface="Consolas" panose="020B0609020204030204" pitchFamily="49" charset="0"/>
-                <a:cs typeface="Consolas" panose="020B0609020204030204" pitchFamily="49" charset="0"/>
-              </a:rPr>
-              <a:t>vendor</a:t>
-            </a:r>
-            <a:r>
-              <a:rPr lang="fr-FR" sz="800" dirty="0" smtClean="0">
-                <a:solidFill>
-                  <a:srgbClr val="0070C0"/>
-                </a:solidFill>
-                <a:latin typeface="Consolas" panose="020B0609020204030204" pitchFamily="49" charset="0"/>
-                <a:cs typeface="Consolas" panose="020B0609020204030204" pitchFamily="49" charset="0"/>
-              </a:rPr>
-              <a:t>\</a:t>
             </a:r>
             <a:r>
               <a:rPr lang="fr-FR" sz="800" dirty="0" err="1" smtClean="0">
@@ -5047,12 +5048,12 @@
         </p:nvCxnSpPr>
         <p:spPr>
           <a:xfrm flipV="1">
-            <a:off x="3136303" y="1831169"/>
-            <a:ext cx="698496" cy="286760"/>
+            <a:off x="2802234" y="1831169"/>
+            <a:ext cx="1032565" cy="286760"/>
           </a:xfrm>
           <a:prstGeom prst="bentConnector3">
             <a:avLst>
-              <a:gd name="adj1" fmla="val 29773"/>
+              <a:gd name="adj1" fmla="val 50000"/>
             </a:avLst>
           </a:prstGeom>
           <a:ln w="12700">
@@ -5171,7 +5172,7 @@
         <p:spPr>
           <a:xfrm>
             <a:off x="922248" y="2446394"/>
-            <a:ext cx="1709999" cy="215444"/>
+            <a:ext cx="2178667" cy="215444"/>
           </a:xfrm>
           <a:prstGeom prst="rect">
             <a:avLst/>
@@ -5193,6 +5194,16 @@
                 <a:cs typeface="Consolas" panose="020B0609020204030204" pitchFamily="49" charset="0"/>
               </a:rPr>
               <a:t>$source</a:t>
+            </a:r>
+            <a:r>
+              <a:rPr lang="fr-FR" sz="800" dirty="0">
+                <a:solidFill>
+                  <a:srgbClr val="0070C0"/>
+                </a:solidFill>
+                <a:latin typeface="Consolas" panose="020B0609020204030204" pitchFamily="49" charset="0"/>
+                <a:cs typeface="Consolas" panose="020B0609020204030204" pitchFamily="49" charset="0"/>
+              </a:rPr>
+              <a:t>\server</a:t>
             </a:r>
             <a:r>
               <a:rPr lang="fr-FR" sz="800" dirty="0" smtClean="0">
@@ -5268,7 +5279,7 @@
         <p:spPr>
           <a:xfrm>
             <a:off x="921532" y="2661838"/>
-            <a:ext cx="1422683" cy="215444"/>
+            <a:ext cx="1994284" cy="215444"/>
           </a:xfrm>
           <a:prstGeom prst="rect">
             <a:avLst/>
@@ -5294,12 +5305,22 @@
             <a:r>
               <a:rPr lang="fr-FR" sz="800" dirty="0" smtClean="0">
                 <a:solidFill>
-                  <a:srgbClr val="FF0000"/>
+                  <a:srgbClr val="0070C0"/>
                 </a:solidFill>
                 <a:latin typeface="Consolas" panose="020B0609020204030204" pitchFamily="49" charset="0"/>
                 <a:cs typeface="Consolas" panose="020B0609020204030204" pitchFamily="49" charset="0"/>
               </a:rPr>
-              <a:t>\trash\</a:t>
+              <a:t>\server</a:t>
+            </a:r>
+            <a:r>
+              <a:rPr lang="fr-FR" sz="800" dirty="0">
+                <a:solidFill>
+                  <a:srgbClr val="FF0000"/>
+                </a:solidFill>
+                <a:latin typeface="Consolas" panose="020B0609020204030204" pitchFamily="49" charset="0"/>
+                <a:cs typeface="Consolas" panose="020B0609020204030204" pitchFamily="49" charset="0"/>
+              </a:rPr>
+              <a:t>\backup\</a:t>
             </a:r>
             <a:r>
               <a:rPr lang="fr-FR" sz="800" dirty="0" err="1" smtClean="0">
@@ -5481,8 +5502,8 @@
         </p:nvSpPr>
         <p:spPr>
           <a:xfrm>
-            <a:off x="120859" y="2394417"/>
-            <a:ext cx="800219" cy="567129"/>
+            <a:off x="120859" y="2383785"/>
+            <a:ext cx="800219" cy="577761"/>
           </a:xfrm>
           <a:prstGeom prst="rect">
             <a:avLst/>
@@ -5695,8 +5716,8 @@
         </p:nvSpPr>
         <p:spPr>
           <a:xfrm>
-            <a:off x="2604820" y="2555444"/>
-            <a:ext cx="2601429" cy="215444"/>
+            <a:off x="2978684" y="2492896"/>
+            <a:ext cx="1300714" cy="338554"/>
           </a:xfrm>
           <a:prstGeom prst="rect">
             <a:avLst/>
@@ -5821,7 +5842,7 @@
         </p:nvSpPr>
         <p:spPr>
           <a:xfrm>
-            <a:off x="2597201" y="2553770"/>
+            <a:off x="2971064" y="2553770"/>
             <a:ext cx="45719" cy="246977"/>
           </a:xfrm>
           <a:prstGeom prst="rightBrace">
@@ -6080,13 +6101,18 @@
         </p:nvSpPr>
         <p:spPr>
           <a:xfrm>
-            <a:off x="-1" y="2904228"/>
-            <a:ext cx="5004049" cy="276999"/>
+            <a:off x="0" y="2904228"/>
+            <a:ext cx="3441152" cy="276999"/>
           </a:xfrm>
           <a:prstGeom prst="rect">
             <a:avLst/>
           </a:prstGeom>
-          <a:noFill/>
+          <a:solidFill>
+            <a:schemeClr val="accent6">
+              <a:lumMod val="60000"/>
+              <a:lumOff val="40000"/>
+            </a:schemeClr>
+          </a:solidFill>
         </p:spPr>
         <p:txBody>
           <a:bodyPr wrap="square" rtlCol="0">
@@ -6365,17 +6391,7 @@
                   </a:schemeClr>
                 </a:solidFill>
               </a:rPr>
-              <a:t> </a:t>
-            </a:r>
-            <a:r>
-              <a:rPr lang="fr-FR" sz="1200" b="1" dirty="0" smtClean="0">
-                <a:solidFill>
-                  <a:schemeClr val="accent1">
-                    <a:lumMod val="75000"/>
-                  </a:schemeClr>
-                </a:solidFill>
-              </a:rPr>
-              <a:t>to </a:t>
+              <a:t> to </a:t>
             </a:r>
             <a:r>
               <a:rPr lang="fr-FR" sz="1200" b="1" dirty="0" err="1" smtClean="0">
@@ -6840,7 +6856,7 @@
         </p:nvSpPr>
         <p:spPr>
           <a:xfrm>
-            <a:off x="-9798" y="6582544"/>
+            <a:off x="-9798" y="6510536"/>
             <a:ext cx="7318102" cy="230832"/>
           </a:xfrm>
           <a:prstGeom prst="rect">
@@ -8363,9 +8379,21 @@
               </a:r>
               <a:r>
                 <a:rPr lang="fr-FR" sz="1100" b="1" dirty="0" smtClean="0"/>
-                <a:t> Source directory</a:t>
+                <a:t> </a:t>
               </a:r>
-              <a:endParaRPr lang="fr-FR" sz="1100" b="1" dirty="0"/>
+              <a:r>
+                <a:rPr lang="fr-FR" sz="1100" b="1" dirty="0" smtClean="0">
+                  <a:solidFill>
+                    <a:srgbClr val="006600"/>
+                  </a:solidFill>
+                </a:rPr>
+                <a:t>Source directory</a:t>
+              </a:r>
+              <a:endParaRPr lang="fr-FR" sz="1100" b="1" dirty="0">
+                <a:solidFill>
+                  <a:srgbClr val="006600"/>
+                </a:solidFill>
+              </a:endParaRPr>
             </a:p>
           </p:txBody>
         </p:sp>
@@ -9062,13 +9090,18 @@
         </p:nvSpPr>
         <p:spPr>
           <a:xfrm>
-            <a:off x="-7644" y="4778244"/>
-            <a:ext cx="5004049" cy="276999"/>
+            <a:off x="-7643" y="4778244"/>
+            <a:ext cx="4261494" cy="276999"/>
           </a:xfrm>
           <a:prstGeom prst="rect">
             <a:avLst/>
           </a:prstGeom>
-          <a:noFill/>
+          <a:solidFill>
+            <a:schemeClr val="accent2">
+              <a:lumMod val="40000"/>
+              <a:lumOff val="60000"/>
+            </a:schemeClr>
+          </a:solidFill>
         </p:spPr>
         <p:txBody>
           <a:bodyPr wrap="square" rtlCol="0">
@@ -10243,47 +10276,6 @@
           </a:p>
         </p:txBody>
       </p:sp>
-      <p:pic>
-        <p:nvPicPr>
-          <p:cNvPr id="280" name="Picture 14" descr="d:\Profiles\jcaillon\AppData\Local\Temp\filled_filter.png"/>
-          <p:cNvPicPr>
-            <a:picLocks noChangeAspect="1" noChangeArrowheads="1"/>
-          </p:cNvPicPr>
-          <p:nvPr/>
-        </p:nvPicPr>
-        <p:blipFill>
-          <a:blip r:embed="rId12" cstate="print">
-            <a:extLst>
-              <a:ext uri="{28A0092B-C50C-407E-A947-70E740481C1C}">
-                <a14:useLocalDpi xmlns:a14="http://schemas.microsoft.com/office/drawing/2010/main" val="0"/>
-              </a:ext>
-            </a:extLst>
-          </a:blip>
-          <a:srcRect/>
-          <a:stretch>
-            <a:fillRect/>
-          </a:stretch>
-        </p:blipFill>
-        <p:spPr bwMode="auto">
-          <a:xfrm>
-            <a:off x="56219" y="5803846"/>
-            <a:ext cx="183381" cy="183381"/>
-          </a:xfrm>
-          <a:prstGeom prst="rect">
-            <a:avLst/>
-          </a:prstGeom>
-          <a:noFill/>
-          <a:extLst>
-            <a:ext uri="{909E8E84-426E-40DD-AFC4-6F175D3DCCD1}">
-              <a14:hiddenFill xmlns:a14="http://schemas.microsoft.com/office/drawing/2010/main">
-                <a:solidFill>
-                  <a:srgbClr val="FFFFFF"/>
-                </a:solidFill>
-              </a14:hiddenFill>
-            </a:ext>
-          </a:extLst>
-        </p:spPr>
-      </p:pic>
       <p:sp>
         <p:nvSpPr>
           <p:cNvPr id="281" name="ZoneTexte 280"/>
@@ -10292,8 +10284,8 @@
         </p:nvSpPr>
         <p:spPr>
           <a:xfrm>
-            <a:off x="145604" y="5630817"/>
-            <a:ext cx="646331" cy="529438"/>
+            <a:off x="145604" y="5082708"/>
+            <a:ext cx="646331" cy="1154603"/>
           </a:xfrm>
           <a:prstGeom prst="rect">
             <a:avLst/>
@@ -10308,28 +10300,63 @@
           <a:p>
             <a:pPr algn="ctr"/>
             <a:r>
+              <a:rPr lang="fr-FR" sz="1000" dirty="0" smtClean="0">
+                <a:solidFill>
+                  <a:srgbClr val="002060"/>
+                </a:solidFill>
+              </a:rPr>
+              <a:t>No </a:t>
+            </a:r>
+            <a:r>
               <a:rPr lang="fr-FR" sz="1000" dirty="0" err="1" smtClean="0">
                 <a:solidFill>
                   <a:srgbClr val="002060"/>
                 </a:solidFill>
               </a:rPr>
-              <a:t>Include</a:t>
-            </a:r>
-            <a:endParaRPr lang="fr-FR" sz="1000" dirty="0" smtClean="0">
-              <a:solidFill>
-                <a:srgbClr val="002060"/>
-              </a:solidFill>
-            </a:endParaRPr>
+              <a:t>filters</a:t>
+            </a:r>
+            <a:r>
+              <a:rPr lang="fr-FR" sz="1000" dirty="0" smtClean="0">
+                <a:solidFill>
+                  <a:srgbClr val="002060"/>
+                </a:solidFill>
+              </a:rPr>
+              <a:t>  for </a:t>
+            </a:r>
+            <a:r>
+              <a:rPr lang="fr-FR" sz="1000" dirty="0" err="1" smtClean="0">
+                <a:solidFill>
+                  <a:srgbClr val="002060"/>
+                </a:solidFill>
+              </a:rPr>
+              <a:t>step</a:t>
+            </a:r>
+            <a:r>
+              <a:rPr lang="fr-FR" sz="1000" dirty="0" smtClean="0">
+                <a:solidFill>
+                  <a:srgbClr val="002060"/>
+                </a:solidFill>
+              </a:rPr>
+              <a:t> 2</a:t>
+            </a:r>
           </a:p>
           <a:p>
             <a:pPr algn="ctr"/>
             <a:r>
+              <a:rPr lang="fr-FR" sz="1000" dirty="0" smtClean="0">
+                <a:solidFill>
+                  <a:srgbClr val="002060"/>
+                </a:solidFill>
+              </a:rPr>
+              <a:t>&gt; All the files are </a:t>
+            </a:r>
+            <a:r>
               <a:rPr lang="fr-FR" sz="1000" dirty="0" err="1" smtClean="0">
                 <a:solidFill>
                   <a:srgbClr val="002060"/>
                 </a:solidFill>
               </a:rPr>
-              <a:t>Filter</a:t>
+              <a:t>eligible</a:t>
             </a:r>
             <a:r>
               <a:rPr lang="fr-FR" sz="1000" dirty="0" smtClean="0">
@@ -10337,7 +10364,7 @@
                   <a:srgbClr val="002060"/>
                 </a:solidFill>
               </a:rPr>
-              <a:t> </a:t>
+              <a:t> to </a:t>
             </a:r>
             <a:r>
               <a:rPr lang="fr-FR" sz="1000" dirty="0" err="1" smtClean="0">
@@ -10345,15 +10372,7 @@
                   <a:srgbClr val="002060"/>
                 </a:solidFill>
               </a:rPr>
-              <a:t>rule</a:t>
-            </a:r>
-            <a:r>
-              <a:rPr lang="fr-FR" sz="1000" dirty="0" smtClean="0">
-                <a:solidFill>
-                  <a:srgbClr val="002060"/>
-                </a:solidFill>
-              </a:rPr>
-              <a:t> 1</a:t>
+              <a:t>transfers</a:t>
             </a:r>
             <a:endParaRPr lang="fr-FR" sz="900" dirty="0">
               <a:solidFill>
@@ -11129,6 +11148,240 @@
           </a:extLst>
         </p:spPr>
       </p:pic>
+      <p:pic>
+        <p:nvPicPr>
+          <p:cNvPr id="1026" name="Picture 2" descr="D:\Profiles\jcaillon\Downloads\Anchor-96.png"/>
+          <p:cNvPicPr>
+            <a:picLocks noChangeAspect="1" noChangeArrowheads="1"/>
+          </p:cNvPicPr>
+          <p:nvPr/>
+        </p:nvPicPr>
+        <p:blipFill>
+          <a:blip r:embed="rId25" cstate="print">
+            <a:extLst>
+              <a:ext uri="{28A0092B-C50C-407E-A947-70E740481C1C}">
+                <a14:useLocalDpi xmlns:a14="http://schemas.microsoft.com/office/drawing/2010/main" val="0"/>
+              </a:ext>
+            </a:extLst>
+          </a:blip>
+          <a:srcRect/>
+          <a:stretch>
+            <a:fillRect/>
+          </a:stretch>
+        </p:blipFill>
+        <p:spPr bwMode="auto">
+          <a:xfrm>
+            <a:off x="4187078" y="2740206"/>
+            <a:ext cx="280508" cy="280508"/>
+          </a:xfrm>
+          <a:prstGeom prst="rect">
+            <a:avLst/>
+          </a:prstGeom>
+          <a:noFill/>
+          <a:extLst>
+            <a:ext uri="{909E8E84-426E-40DD-AFC4-6F175D3DCCD1}">
+              <a14:hiddenFill xmlns:a14="http://schemas.microsoft.com/office/drawing/2010/main">
+                <a:solidFill>
+                  <a:srgbClr val="FFFFFF"/>
+                </a:solidFill>
+              </a14:hiddenFill>
+            </a:ext>
+          </a:extLst>
+        </p:spPr>
+      </p:pic>
+      <p:sp>
+        <p:nvSpPr>
+          <p:cNvPr id="3" name="ZoneTexte 2"/>
+          <p:cNvSpPr txBox="1"/>
+          <p:nvPr/>
+        </p:nvSpPr>
+        <p:spPr>
+          <a:xfrm>
+            <a:off x="4467586" y="2731798"/>
+            <a:ext cx="1186370" cy="261610"/>
+          </a:xfrm>
+          <a:prstGeom prst="rect">
+            <a:avLst/>
+          </a:prstGeom>
+          <a:noFill/>
+        </p:spPr>
+        <p:txBody>
+          <a:bodyPr wrap="square" rtlCol="0">
+            <a:spAutoFit/>
+          </a:bodyPr>
+          <a:lstStyle/>
+          <a:p>
+            <a:endParaRPr lang="fr-FR" sz="1100" dirty="0"/>
+          </a:p>
+        </p:txBody>
+      </p:sp>
+      <p:sp>
+        <p:nvSpPr>
+          <p:cNvPr id="157" name="ZoneTexte 156"/>
+          <p:cNvSpPr txBox="1"/>
+          <p:nvPr/>
+        </p:nvSpPr>
+        <p:spPr>
+          <a:xfrm>
+            <a:off x="4481630" y="2723560"/>
+            <a:ext cx="2316216" cy="338554"/>
+          </a:xfrm>
+          <a:prstGeom prst="rect">
+            <a:avLst/>
+          </a:prstGeom>
+          <a:noFill/>
+        </p:spPr>
+        <p:txBody>
+          <a:bodyPr wrap="square" rtlCol="0">
+            <a:spAutoFit/>
+          </a:bodyPr>
+          <a:lstStyle/>
+          <a:p>
+            <a:r>
+              <a:rPr lang="fr-FR" sz="800" dirty="0" smtClean="0"/>
+              <a:t>At the end of </a:t>
+            </a:r>
+            <a:r>
+              <a:rPr lang="fr-FR" sz="800" dirty="0" err="1" smtClean="0"/>
+              <a:t>each</a:t>
+            </a:r>
+            <a:r>
+              <a:rPr lang="fr-FR" sz="800" dirty="0" smtClean="0"/>
+              <a:t> </a:t>
+            </a:r>
+            <a:r>
+              <a:rPr lang="fr-FR" sz="800" dirty="0" err="1" smtClean="0"/>
+              <a:t>step</a:t>
+            </a:r>
+            <a:r>
+              <a:rPr lang="fr-FR" sz="800" dirty="0" smtClean="0"/>
+              <a:t>, </a:t>
+            </a:r>
+            <a:r>
+              <a:rPr lang="fr-FR" sz="800" dirty="0" err="1" smtClean="0"/>
+              <a:t>you</a:t>
+            </a:r>
+            <a:r>
+              <a:rPr lang="fr-FR" sz="800" dirty="0" smtClean="0"/>
+              <a:t> </a:t>
+            </a:r>
+            <a:r>
+              <a:rPr lang="fr-FR" sz="800" dirty="0" err="1" smtClean="0"/>
+              <a:t>can</a:t>
+            </a:r>
+            <a:r>
+              <a:rPr lang="fr-FR" sz="800" dirty="0" smtClean="0"/>
+              <a:t> </a:t>
+            </a:r>
+            <a:r>
+              <a:rPr lang="fr-FR" sz="800" dirty="0" err="1" smtClean="0"/>
+              <a:t>create</a:t>
+            </a:r>
+            <a:r>
+              <a:rPr lang="fr-FR" sz="800" dirty="0" smtClean="0"/>
+              <a:t> a </a:t>
+            </a:r>
+            <a:r>
+              <a:rPr lang="fr-FR" sz="800" dirty="0" err="1" smtClean="0"/>
+              <a:t>progress</a:t>
+            </a:r>
+            <a:r>
+              <a:rPr lang="fr-FR" sz="800" dirty="0" smtClean="0"/>
+              <a:t> program </a:t>
+            </a:r>
+            <a:r>
+              <a:rPr lang="fr-FR" sz="800" dirty="0" err="1" smtClean="0"/>
+              <a:t>that</a:t>
+            </a:r>
+            <a:r>
+              <a:rPr lang="fr-FR" sz="800" dirty="0" smtClean="0"/>
+              <a:t> </a:t>
+            </a:r>
+            <a:r>
+              <a:rPr lang="fr-FR" sz="800" dirty="0" err="1" smtClean="0"/>
+              <a:t>will</a:t>
+            </a:r>
+            <a:r>
+              <a:rPr lang="fr-FR" sz="800" dirty="0" smtClean="0"/>
+              <a:t> </a:t>
+            </a:r>
+            <a:r>
+              <a:rPr lang="fr-FR" sz="800" dirty="0" err="1" smtClean="0"/>
+              <a:t>be</a:t>
+            </a:r>
+            <a:r>
+              <a:rPr lang="fr-FR" sz="800" dirty="0" smtClean="0"/>
+              <a:t> </a:t>
+            </a:r>
+            <a:r>
+              <a:rPr lang="fr-FR" sz="800" dirty="0" err="1" smtClean="0"/>
+              <a:t>executed</a:t>
+            </a:r>
+            <a:r>
+              <a:rPr lang="fr-FR" sz="800" dirty="0" smtClean="0"/>
+              <a:t> to do </a:t>
+            </a:r>
+            <a:r>
+              <a:rPr lang="fr-FR" sz="800" dirty="0" err="1" smtClean="0"/>
+              <a:t>any</a:t>
+            </a:r>
+            <a:r>
+              <a:rPr lang="fr-FR" sz="800" dirty="0" smtClean="0"/>
+              <a:t> actions</a:t>
+            </a:r>
+            <a:endParaRPr lang="fr-FR" sz="800" dirty="0"/>
+          </a:p>
+        </p:txBody>
+      </p:sp>
+      <p:sp>
+        <p:nvSpPr>
+          <p:cNvPr id="4" name="Rectangle 3"/>
+          <p:cNvSpPr/>
+          <p:nvPr/>
+        </p:nvSpPr>
+        <p:spPr>
+          <a:xfrm>
+            <a:off x="4139784" y="2707084"/>
+            <a:ext cx="2610768" cy="358923"/>
+          </a:xfrm>
+          <a:prstGeom prst="rect">
+            <a:avLst/>
+          </a:prstGeom>
+          <a:noFill/>
+          <a:ln>
+            <a:solidFill>
+              <a:schemeClr val="tx2">
+                <a:lumMod val="40000"/>
+                <a:lumOff val="60000"/>
+              </a:schemeClr>
+            </a:solidFill>
+          </a:ln>
+        </p:spPr>
+        <p:style>
+          <a:lnRef idx="2">
+            <a:schemeClr val="accent1">
+              <a:shade val="50000"/>
+            </a:schemeClr>
+          </a:lnRef>
+          <a:fillRef idx="1">
+            <a:schemeClr val="accent1"/>
+          </a:fillRef>
+          <a:effectRef idx="0">
+            <a:schemeClr val="accent1"/>
+          </a:effectRef>
+          <a:fontRef idx="minor">
+            <a:schemeClr val="lt1"/>
+          </a:fontRef>
+        </p:style>
+        <p:txBody>
+          <a:bodyPr rtlCol="0" anchor="ctr"/>
+          <a:lstStyle/>
+          <a:p>
+            <a:pPr algn="ctr"/>
+            <a:endParaRPr lang="fr-FR"/>
+          </a:p>
+        </p:txBody>
+      </p:sp>
     </p:spTree>
     <p:extLst>
       <p:ext uri="{BB962C8B-B14F-4D97-AF65-F5344CB8AC3E}">
@@ -11146,36 +11399,6 @@
       </p:par>
     </p:tnLst>
   </p:timing>
-</p:sld>
-</file>
-
-<file path=ppt/slides/slide2.xml><?xml version="1.0" encoding="utf-8"?>
-<p:sld xmlns:a="http://schemas.openxmlformats.org/drawingml/2006/main" xmlns:r="http://schemas.openxmlformats.org/officeDocument/2006/relationships" xmlns:p="http://schemas.openxmlformats.org/presentationml/2006/main">
-  <p:cSld>
-    <p:spTree>
-      <p:nvGrpSpPr>
-        <p:cNvPr id="1" name=""/>
-        <p:cNvGrpSpPr/>
-        <p:nvPr/>
-      </p:nvGrpSpPr>
-      <p:grpSpPr>
-        <a:xfrm>
-          <a:off x="0" y="0"/>
-          <a:ext cx="0" cy="0"/>
-          <a:chOff x="0" y="0"/>
-          <a:chExt cx="0" cy="0"/>
-        </a:xfrm>
-      </p:grpSpPr>
-    </p:spTree>
-    <p:extLst>
-      <p:ext uri="{BB962C8B-B14F-4D97-AF65-F5344CB8AC3E}">
-        <p14:creationId xmlns:p14="http://schemas.microsoft.com/office/powerpoint/2010/main" val="935588036"/>
-      </p:ext>
-    </p:extLst>
-  </p:cSld>
-  <p:clrMapOvr>
-    <a:masterClrMapping/>
-  </p:clrMapOvr>
 </p:sld>
 </file>
 

</xml_diff>